<commit_message>
Prepare Q&A slide, Modify body position & size
</commit_message>
<xml_diff>
--- a/doc/제출용/ShareTaxi_PPT.pptx
+++ b/doc/제출용/ShareTaxi_PPT.pptx
@@ -5,7 +5,7 @@
     <p:sldMasterId id="2147483648" r:id="rId1"/>
   </p:sldMasterIdLst>
   <p:notesMasterIdLst>
-    <p:notesMasterId r:id="rId10"/>
+    <p:notesMasterId r:id="rId11"/>
   </p:notesMasterIdLst>
   <p:sldIdLst>
     <p:sldId id="257" r:id="rId2"/>
@@ -15,7 +15,8 @@
     <p:sldId id="266" r:id="rId6"/>
     <p:sldId id="264" r:id="rId7"/>
     <p:sldId id="267" r:id="rId8"/>
-    <p:sldId id="268" r:id="rId9"/>
+    <p:sldId id="269" r:id="rId9"/>
+    <p:sldId id="268" r:id="rId10"/>
   </p:sldIdLst>
   <p:sldSz cx="9144000" cy="6858000" type="screen4x3"/>
   <p:notesSz cx="6858000" cy="9144000"/>
@@ -1283,6 +1284,18 @@
           <a:bodyPr/>
           <a:lstStyle/>
           <a:p>
+            <a:r>
+              <a:rPr lang="en-US" altLang="ko-KR" dirty="0"/>
+              <a:t>(</a:t>
+            </a:r>
+            <a:r>
+              <a:rPr lang="ko-KR" altLang="en-US" dirty="0"/>
+              <a:t>개발 시 사용한 기술 전반에 대한 질문을 받을 경우</a:t>
+            </a:r>
+            <a:r>
+              <a:rPr lang="en-US" altLang="ko-KR" dirty="0"/>
+              <a:t>)</a:t>
+            </a:r>
             <a:endParaRPr lang="ko-KR" altLang="en-US" dirty="0"/>
           </a:p>
         </p:txBody>
@@ -1306,6 +1319,91 @@
               <a:rPr lang="ko-KR" altLang="en-US" smtClean="0"/>
               <a:pPr/>
               <a:t>8</a:t>
+            </a:fld>
+            <a:endParaRPr lang="ko-KR" altLang="en-US"/>
+          </a:p>
+        </p:txBody>
+      </p:sp>
+    </p:spTree>
+    <p:extLst>
+      <p:ext uri="{BB962C8B-B14F-4D97-AF65-F5344CB8AC3E}">
+        <p14:creationId xmlns:p14="http://schemas.microsoft.com/office/powerpoint/2010/main" val="3323831967"/>
+      </p:ext>
+    </p:extLst>
+  </p:cSld>
+  <p:clrMapOvr>
+    <a:masterClrMapping/>
+  </p:clrMapOvr>
+</p:notes>
+</file>
+
+<file path=ppt/notesSlides/notesSlide9.xml><?xml version="1.0" encoding="utf-8"?>
+<p:notes xmlns:a="http://schemas.openxmlformats.org/drawingml/2006/main" xmlns:r="http://schemas.openxmlformats.org/officeDocument/2006/relationships" xmlns:p="http://schemas.openxmlformats.org/presentationml/2006/main">
+  <p:cSld>
+    <p:spTree>
+      <p:nvGrpSpPr>
+        <p:cNvPr id="1" name=""/>
+        <p:cNvGrpSpPr/>
+        <p:nvPr/>
+      </p:nvGrpSpPr>
+      <p:grpSpPr>
+        <a:xfrm>
+          <a:off x="0" y="0"/>
+          <a:ext cx="0" cy="0"/>
+          <a:chOff x="0" y="0"/>
+          <a:chExt cx="0" cy="0"/>
+        </a:xfrm>
+      </p:grpSpPr>
+      <p:sp>
+        <p:nvSpPr>
+          <p:cNvPr id="2" name="슬라이드 이미지 개체 틀 1"/>
+          <p:cNvSpPr>
+            <a:spLocks noGrp="1" noRot="1" noChangeAspect="1"/>
+          </p:cNvSpPr>
+          <p:nvPr>
+            <p:ph type="sldImg"/>
+          </p:nvPr>
+        </p:nvSpPr>
+        <p:spPr/>
+      </p:sp>
+      <p:sp>
+        <p:nvSpPr>
+          <p:cNvPr id="3" name="슬라이드 노트 개체 틀 2"/>
+          <p:cNvSpPr>
+            <a:spLocks noGrp="1"/>
+          </p:cNvSpPr>
+          <p:nvPr>
+            <p:ph type="body" idx="1"/>
+          </p:nvPr>
+        </p:nvSpPr>
+        <p:spPr/>
+        <p:txBody>
+          <a:bodyPr/>
+          <a:lstStyle/>
+          <a:p>
+            <a:endParaRPr lang="ko-KR" altLang="en-US" dirty="0"/>
+          </a:p>
+        </p:txBody>
+      </p:sp>
+      <p:sp>
+        <p:nvSpPr>
+          <p:cNvPr id="4" name="슬라이드 번호 개체 틀 3"/>
+          <p:cNvSpPr>
+            <a:spLocks noGrp="1"/>
+          </p:cNvSpPr>
+          <p:nvPr>
+            <p:ph type="sldNum" sz="quarter" idx="10"/>
+          </p:nvPr>
+        </p:nvSpPr>
+        <p:spPr/>
+        <p:txBody>
+          <a:bodyPr/>
+          <a:lstStyle/>
+          <a:p>
+            <a:fld id="{4BB5971B-9516-40A7-A075-ABEDDD87FA4C}" type="slidenum">
+              <a:rPr lang="ko-KR" altLang="en-US" smtClean="0"/>
+              <a:pPr/>
+              <a:t>9</a:t>
             </a:fld>
             <a:endParaRPr lang="ko-KR" altLang="en-US"/>
           </a:p>
@@ -5375,7 +5473,7 @@
         </p:nvSpPr>
         <p:spPr>
           <a:xfrm>
-            <a:off x="2594486" y="3356992"/>
+            <a:off x="2627784" y="2647668"/>
             <a:ext cx="4187365" cy="398186"/>
           </a:xfrm>
           <a:prstGeom prst="rect">
@@ -5451,7 +5549,7 @@
         </p:nvSpPr>
         <p:spPr>
           <a:xfrm>
-            <a:off x="2198545" y="3755178"/>
+            <a:off x="2231843" y="3045854"/>
             <a:ext cx="4979248" cy="398186"/>
           </a:xfrm>
           <a:prstGeom prst="rect">
@@ -5547,7 +5645,7 @@
         </p:nvSpPr>
         <p:spPr>
           <a:xfrm>
-            <a:off x="1322469" y="4153364"/>
+            <a:off x="1355767" y="3444040"/>
             <a:ext cx="6859571" cy="398186"/>
           </a:xfrm>
           <a:prstGeom prst="rect">
@@ -5684,8 +5782,8 @@
         </p:blipFill>
         <p:spPr>
           <a:xfrm>
-            <a:off x="3714673" y="4765915"/>
-            <a:ext cx="1714649" cy="1737511"/>
+            <a:off x="3486196" y="4054816"/>
+            <a:ext cx="2415564" cy="2447772"/>
           </a:xfrm>
           <a:prstGeom prst="rect">
             <a:avLst/>
@@ -6150,8 +6248,8 @@
         </p:blipFill>
         <p:spPr>
           <a:xfrm>
-            <a:off x="2402395" y="1626478"/>
-            <a:ext cx="4191635" cy="3300730"/>
+            <a:off x="1383304" y="1289316"/>
+            <a:ext cx="6377391" cy="5053324"/>
           </a:xfrm>
           <a:prstGeom prst="rect">
             <a:avLst/>
@@ -6645,7 +6743,7 @@
         </p:blipFill>
         <p:spPr>
           <a:xfrm>
-            <a:off x="3167496" y="2963261"/>
+            <a:off x="3059832" y="2132856"/>
             <a:ext cx="2664296" cy="2337947"/>
           </a:xfrm>
           <a:prstGeom prst="rect">
@@ -6661,7 +6759,7 @@
         </p:nvSpPr>
         <p:spPr>
           <a:xfrm>
-            <a:off x="3606846" y="3947568"/>
+            <a:off x="3499182" y="3117163"/>
             <a:ext cx="1758135" cy="369332"/>
           </a:xfrm>
           <a:prstGeom prst="rect">
@@ -7115,6 +7213,239 @@
       </p:pic>
       <p:sp>
         <p:nvSpPr>
+          <p:cNvPr id="12" name="슬라이드 번호 개체 틀 31"/>
+          <p:cNvSpPr>
+            <a:spLocks noGrp="1"/>
+          </p:cNvSpPr>
+          <p:nvPr>
+            <p:ph type="sldNum" sz="quarter" idx="12"/>
+          </p:nvPr>
+        </p:nvSpPr>
+        <p:spPr>
+          <a:xfrm>
+            <a:off x="6553200" y="6356350"/>
+            <a:ext cx="2133600" cy="365125"/>
+          </a:xfrm>
+        </p:spPr>
+        <p:txBody>
+          <a:bodyPr/>
+          <a:lstStyle/>
+          <a:p>
+            <a:fld id="{8D28410B-1D6C-45E7-A2A1-04AA6526E8C7}" type="slidenum">
+              <a:rPr lang="ko-KR" altLang="en-US" smtClean="0"/>
+              <a:pPr/>
+              <a:t>8</a:t>
+            </a:fld>
+            <a:endParaRPr lang="ko-KR" altLang="en-US" dirty="0"/>
+          </a:p>
+        </p:txBody>
+      </p:sp>
+      <p:pic>
+        <p:nvPicPr>
+          <p:cNvPr id="4" name="그림 3">
+            <a:extLst>
+              <a:ext uri="{FF2B5EF4-FFF2-40B4-BE49-F238E27FC236}">
+                <a16:creationId xmlns:a16="http://schemas.microsoft.com/office/drawing/2014/main" id="{E1B5B5EC-7AD3-4E85-A1D1-399BD21E0E35}"/>
+              </a:ext>
+            </a:extLst>
+          </p:cNvPr>
+          <p:cNvPicPr>
+            <a:picLocks noChangeAspect="1"/>
+          </p:cNvPicPr>
+          <p:nvPr/>
+        </p:nvPicPr>
+        <p:blipFill>
+          <a:blip r:embed="rId4"/>
+          <a:stretch>
+            <a:fillRect/>
+          </a:stretch>
+        </p:blipFill>
+        <p:spPr>
+          <a:xfrm>
+            <a:off x="143586" y="2796119"/>
+            <a:ext cx="4354895" cy="1800200"/>
+          </a:xfrm>
+          <a:prstGeom prst="rect">
+            <a:avLst/>
+          </a:prstGeom>
+        </p:spPr>
+      </p:pic>
+      <p:pic>
+        <p:nvPicPr>
+          <p:cNvPr id="5" name="그림 4">
+            <a:extLst>
+              <a:ext uri="{FF2B5EF4-FFF2-40B4-BE49-F238E27FC236}">
+                <a16:creationId xmlns:a16="http://schemas.microsoft.com/office/drawing/2014/main" id="{B2E365C1-26FB-40BF-B7B1-A55966D6FD1C}"/>
+              </a:ext>
+            </a:extLst>
+          </p:cNvPr>
+          <p:cNvPicPr>
+            <a:picLocks noChangeAspect="1"/>
+          </p:cNvPicPr>
+          <p:nvPr/>
+        </p:nvPicPr>
+        <p:blipFill>
+          <a:blip r:embed="rId5"/>
+          <a:stretch>
+            <a:fillRect/>
+          </a:stretch>
+        </p:blipFill>
+        <p:spPr>
+          <a:xfrm>
+            <a:off x="5232521" y="4836776"/>
+            <a:ext cx="3287468" cy="2009416"/>
+          </a:xfrm>
+          <a:prstGeom prst="rect">
+            <a:avLst/>
+          </a:prstGeom>
+        </p:spPr>
+      </p:pic>
+      <p:pic>
+        <p:nvPicPr>
+          <p:cNvPr id="6" name="그림 5">
+            <a:extLst>
+              <a:ext uri="{FF2B5EF4-FFF2-40B4-BE49-F238E27FC236}">
+                <a16:creationId xmlns:a16="http://schemas.microsoft.com/office/drawing/2014/main" id="{E5ED29B0-632B-4C73-8B12-D4155018EE90}"/>
+              </a:ext>
+            </a:extLst>
+          </p:cNvPr>
+          <p:cNvPicPr>
+            <a:picLocks noChangeAspect="1"/>
+          </p:cNvPicPr>
+          <p:nvPr/>
+        </p:nvPicPr>
+        <p:blipFill>
+          <a:blip r:embed="rId6"/>
+          <a:stretch>
+            <a:fillRect/>
+          </a:stretch>
+        </p:blipFill>
+        <p:spPr>
+          <a:xfrm>
+            <a:off x="272119" y="5047913"/>
+            <a:ext cx="4367588" cy="1673562"/>
+          </a:xfrm>
+          <a:prstGeom prst="rect">
+            <a:avLst/>
+          </a:prstGeom>
+        </p:spPr>
+      </p:pic>
+      <p:pic>
+        <p:nvPicPr>
+          <p:cNvPr id="7" name="그림 6">
+            <a:extLst>
+              <a:ext uri="{FF2B5EF4-FFF2-40B4-BE49-F238E27FC236}">
+                <a16:creationId xmlns:a16="http://schemas.microsoft.com/office/drawing/2014/main" id="{0A21D233-EB9A-4DFD-914A-6233B8668E96}"/>
+              </a:ext>
+            </a:extLst>
+          </p:cNvPr>
+          <p:cNvPicPr>
+            <a:picLocks noChangeAspect="1"/>
+          </p:cNvPicPr>
+          <p:nvPr/>
+        </p:nvPicPr>
+        <p:blipFill>
+          <a:blip r:embed="rId7"/>
+          <a:stretch>
+            <a:fillRect/>
+          </a:stretch>
+        </p:blipFill>
+        <p:spPr>
+          <a:xfrm>
+            <a:off x="2321034" y="-1"/>
+            <a:ext cx="4555221" cy="2784311"/>
+          </a:xfrm>
+          <a:prstGeom prst="rect">
+            <a:avLst/>
+          </a:prstGeom>
+        </p:spPr>
+      </p:pic>
+      <p:pic>
+        <p:nvPicPr>
+          <p:cNvPr id="8" name="그림 7">
+            <a:extLst>
+              <a:ext uri="{FF2B5EF4-FFF2-40B4-BE49-F238E27FC236}">
+                <a16:creationId xmlns:a16="http://schemas.microsoft.com/office/drawing/2014/main" id="{B1DD2AE3-FAF2-4C4D-859E-FA3B35CC5CA9}"/>
+              </a:ext>
+            </a:extLst>
+          </p:cNvPr>
+          <p:cNvPicPr>
+            <a:picLocks noChangeAspect="1"/>
+          </p:cNvPicPr>
+          <p:nvPr/>
+        </p:nvPicPr>
+        <p:blipFill>
+          <a:blip r:embed="rId8"/>
+          <a:stretch>
+            <a:fillRect/>
+          </a:stretch>
+        </p:blipFill>
+        <p:spPr>
+          <a:xfrm>
+            <a:off x="4571995" y="2859438"/>
+            <a:ext cx="4325730" cy="1673561"/>
+          </a:xfrm>
+          <a:prstGeom prst="rect">
+            <a:avLst/>
+          </a:prstGeom>
+        </p:spPr>
+      </p:pic>
+    </p:spTree>
+    <p:extLst>
+      <p:ext uri="{BB962C8B-B14F-4D97-AF65-F5344CB8AC3E}">
+        <p14:creationId xmlns:p14="http://schemas.microsoft.com/office/powerpoint/2010/main" val="3857219254"/>
+      </p:ext>
+    </p:extLst>
+  </p:cSld>
+  <p:clrMapOvr>
+    <a:masterClrMapping/>
+  </p:clrMapOvr>
+</p:sld>
+</file>
+
+<file path=ppt/slides/slide9.xml><?xml version="1.0" encoding="utf-8"?>
+<p:sld xmlns:a="http://schemas.openxmlformats.org/drawingml/2006/main" xmlns:r="http://schemas.openxmlformats.org/officeDocument/2006/relationships" xmlns:p="http://schemas.openxmlformats.org/presentationml/2006/main">
+  <p:cSld>
+    <p:spTree>
+      <p:nvGrpSpPr>
+        <p:cNvPr id="1" name=""/>
+        <p:cNvGrpSpPr/>
+        <p:nvPr/>
+      </p:nvGrpSpPr>
+      <p:grpSpPr>
+        <a:xfrm>
+          <a:off x="0" y="0"/>
+          <a:ext cx="0" cy="0"/>
+          <a:chOff x="0" y="0"/>
+          <a:chExt cx="0" cy="0"/>
+        </a:xfrm>
+      </p:grpSpPr>
+      <p:pic>
+        <p:nvPicPr>
+          <p:cNvPr id="13" name="그림 12" descr="배경.png"/>
+          <p:cNvPicPr>
+            <a:picLocks noChangeAspect="1"/>
+          </p:cNvPicPr>
+          <p:nvPr/>
+        </p:nvPicPr>
+        <p:blipFill>
+          <a:blip r:embed="rId3" cstate="print"/>
+          <a:stretch>
+            <a:fillRect/>
+          </a:stretch>
+        </p:blipFill>
+        <p:spPr>
+          <a:xfrm>
+            <a:off x="2360" y="11808"/>
+            <a:ext cx="9139271" cy="6858000"/>
+          </a:xfrm>
+          <a:prstGeom prst="rect">
+            <a:avLst/>
+          </a:prstGeom>
+        </p:spPr>
+      </p:pic>
+      <p:sp>
+        <p:nvSpPr>
           <p:cNvPr id="3" name="TextBox 2"/>
           <p:cNvSpPr txBox="1"/>
           <p:nvPr/>
@@ -7122,7 +7453,7 @@
         <p:spPr>
           <a:xfrm>
             <a:off x="4096134" y="211111"/>
-            <a:ext cx="1049956" cy="477054"/>
+            <a:ext cx="1339962" cy="477054"/>
           </a:xfrm>
           <a:prstGeom prst="rect">
             <a:avLst/>
@@ -7171,7 +7502,7 @@
             <a:fld id="{8D28410B-1D6C-45E7-A2A1-04AA6526E8C7}" type="slidenum">
               <a:rPr lang="ko-KR" altLang="en-US" smtClean="0"/>
               <a:pPr/>
-              <a:t>8</a:t>
+              <a:t>9</a:t>
             </a:fld>
             <a:endParaRPr lang="ko-KR" altLang="en-US" dirty="0"/>
           </a:p>

</xml_diff>

<commit_message>
Project PPT Final Update
</commit_message>
<xml_diff>
--- a/doc/제출용/ShareTaxi_PPT.pptx
+++ b/doc/제출용/ShareTaxi_PPT.pptx
@@ -217,7 +217,7 @@
             <a:fld id="{8FD8DFA8-FA80-42F2-8EE4-6AEF86CE835E}" type="datetimeFigureOut">
               <a:rPr lang="ko-KR" altLang="en-US" smtClean="0"/>
               <a:pPr/>
-              <a:t>2018-06-18</a:t>
+              <a:t>2018-06-19</a:t>
             </a:fld>
             <a:endParaRPr lang="ko-KR" altLang="en-US"/>
           </a:p>
@@ -744,7 +744,7 @@
           <a:p>
             <a:r>
               <a:rPr lang="ko-KR" altLang="en-US" dirty="0"/>
-              <a:t>저희는 평소에 겪었던 불편함에 대해서 생각했습니다</a:t>
+              <a:t>저희는 평소에 대중교통을 이용할 때 겪었던 불편함에 대해서 생각했습니다</a:t>
             </a:r>
             <a:r>
               <a:rPr lang="en-US" altLang="ko-KR" dirty="0"/>
@@ -754,7 +754,7 @@
           <a:p>
             <a:r>
               <a:rPr lang="ko-KR" altLang="en-US" dirty="0"/>
-              <a:t>그리고 대부분의 학생들이 공감할 만한 문제점을 떠올렸죠</a:t>
+              <a:t>그리고 대중교통을 이용하는 대부분의 학생들이 공감할 만한 문제점을 떠올렸죠</a:t>
             </a:r>
             <a:r>
               <a:rPr lang="en-US" altLang="ko-KR" dirty="0"/>
@@ -763,6 +763,16 @@
           </a:p>
           <a:p>
             <a:r>
+              <a:rPr lang="ko-KR" altLang="en-US" dirty="0"/>
+              <a:t>여러분은</a:t>
+            </a:r>
+            <a:r>
+              <a:rPr lang="en-US" altLang="ko-KR" dirty="0"/>
+              <a:t>,</a:t>
+            </a:r>
+          </a:p>
+          <a:p>
+            <a:r>
               <a:rPr lang="en-US" altLang="ko-KR" dirty="0"/>
               <a:t>---</a:t>
             </a:r>
@@ -772,7 +782,7 @@
             </a:r>
             <a:r>
               <a:rPr lang="en-US" altLang="ko-KR" dirty="0"/>
-              <a:t>--</a:t>
+              <a:t>—</a:t>
             </a:r>
           </a:p>
           <a:p>
@@ -786,6 +796,14 @@
             </a:r>
             <a:r>
               <a:rPr lang="ko-KR" altLang="en-US" dirty="0"/>
+              <a:t>정해진</a:t>
+            </a:r>
+            <a:r>
+              <a:rPr lang="en-US" altLang="ko-KR" dirty="0"/>
+              <a:t> </a:t>
+            </a:r>
+            <a:r>
+              <a:rPr lang="ko-KR" altLang="en-US" dirty="0"/>
               <a:t>장소에만 머무르고</a:t>
             </a:r>
             <a:r>
@@ -794,7 +812,7 @@
             </a:r>
             <a:r>
               <a:rPr lang="ko-KR" altLang="en-US" dirty="0"/>
-              <a:t>특정 시간에는 이용객들이 몰려서 불편함이 많죠</a:t>
+              <a:t>특정 시간에는 이용객들이 몰려서 불편함이 많습니다</a:t>
             </a:r>
             <a:r>
               <a:rPr lang="en-US" altLang="ko-KR" dirty="0"/>
@@ -804,7 +822,7 @@
           <a:p>
             <a:r>
               <a:rPr lang="ko-KR" altLang="en-US" dirty="0"/>
-              <a:t>택시는 이러한 불편함을 해결할 수 있지만 학생으로서 비용이 부담이 됩니다</a:t>
+              <a:t>택시는 이러한 불편함을 해결할 수 있지만 학생으로서 비용이 부담이 될 수 있죠</a:t>
             </a:r>
             <a:r>
               <a:rPr lang="en-US" altLang="ko-KR" dirty="0"/>
@@ -915,7 +933,7 @@
           <a:p>
             <a:r>
               <a:rPr lang="ko-KR" altLang="en-US" dirty="0"/>
-              <a:t>초안 인터페이스입니다</a:t>
+              <a:t>저희가 앞서 이야기한 불편함을 해결하기 위해서 제작하고자 한 어플리케이션의 초안 인터페이스입니다</a:t>
             </a:r>
             <a:r>
               <a:rPr lang="en-US" altLang="ko-KR" dirty="0"/>
@@ -925,7 +943,86 @@
           <a:p>
             <a:r>
               <a:rPr lang="ko-KR" altLang="en-US" dirty="0"/>
-              <a:t>당시 머리 속으로만 생각했던 어플리케이션의 모습이었죠</a:t>
+              <a:t>해당 서비스를 이용하기 위해서 간단하게 </a:t>
+            </a:r>
+            <a:r>
+              <a:rPr lang="en-US" altLang="ko-KR" dirty="0"/>
+              <a:t>4</a:t>
+            </a:r>
+            <a:r>
+              <a:rPr lang="ko-KR" altLang="en-US" dirty="0"/>
+              <a:t>단계만 거치도록 고안하였죠</a:t>
+            </a:r>
+            <a:r>
+              <a:rPr lang="en-US" altLang="ko-KR" dirty="0"/>
+              <a:t>.</a:t>
+            </a:r>
+          </a:p>
+          <a:p>
+            <a:r>
+              <a:rPr lang="ko-KR" altLang="en-US" dirty="0"/>
+              <a:t>첫 번째는 출발지와 목적지를 정하는 단계</a:t>
+            </a:r>
+            <a:endParaRPr lang="en-US" altLang="ko-KR" dirty="0"/>
+          </a:p>
+          <a:p>
+            <a:r>
+              <a:rPr lang="ko-KR" altLang="en-US" dirty="0"/>
+              <a:t>두 번째는 동승할 사람들을 찾는 단계</a:t>
+            </a:r>
+            <a:endParaRPr lang="en-US" altLang="ko-KR" dirty="0"/>
+          </a:p>
+          <a:p>
+            <a:r>
+              <a:rPr lang="ko-KR" altLang="en-US" dirty="0"/>
+              <a:t>세 번째는 동승할 인원들 간 커뮤니케이션을 할 수 있는 단계</a:t>
+            </a:r>
+            <a:endParaRPr lang="en-US" altLang="ko-KR" dirty="0"/>
+          </a:p>
+          <a:p>
+            <a:r>
+              <a:rPr lang="ko-KR" altLang="en-US" dirty="0"/>
+              <a:t>그리고 마지막으로</a:t>
+            </a:r>
+            <a:r>
+              <a:rPr lang="en-US" altLang="ko-KR" dirty="0"/>
+              <a:t>,</a:t>
+            </a:r>
+            <a:r>
+              <a:rPr lang="ko-KR" altLang="en-US" dirty="0"/>
+              <a:t> 상호 평가 단계로 구성되어 있습니다</a:t>
+            </a:r>
+            <a:r>
+              <a:rPr lang="en-US" altLang="ko-KR" dirty="0"/>
+              <a:t>.</a:t>
+            </a:r>
+          </a:p>
+          <a:p>
+            <a:r>
+              <a:rPr lang="ko-KR" altLang="en-US" dirty="0"/>
+              <a:t>저희는 익명성을 기반으로 서비스를 제공하고자 생각하였습니다</a:t>
+            </a:r>
+            <a:r>
+              <a:rPr lang="en-US" altLang="ko-KR" dirty="0"/>
+              <a:t>. </a:t>
+            </a:r>
+            <a:r>
+              <a:rPr lang="ko-KR" altLang="en-US" dirty="0"/>
+              <a:t>하지만 그로 인해 발생할 수 있는 동승자에 대한 문제점들을 예방할 수도 있어야했죠</a:t>
+            </a:r>
+            <a:r>
+              <a:rPr lang="en-US" altLang="ko-KR" dirty="0"/>
+              <a:t>.</a:t>
+            </a:r>
+          </a:p>
+          <a:p>
+            <a:r>
+              <a:rPr lang="ko-KR" altLang="en-US" dirty="0"/>
+              <a:t>이러한 점들을 예방하기 위해 문제의 소지가 발생할 수 있는 동승자인지 판단은 유저들끼리 하도록 상호평가 시스템을 도입하였습니다</a:t>
+            </a:r>
+            <a:r>
+              <a:rPr lang="en-US" altLang="ko-KR" dirty="0"/>
+              <a:t>.</a:t>
             </a:r>
           </a:p>
         </p:txBody>
@@ -1013,23 +1110,12 @@
           <a:p>
             <a:r>
               <a:rPr lang="ko-KR" altLang="en-US" dirty="0"/>
-              <a:t>공책 속에만 존재 했던 인터페이스가 이렇게 짠</a:t>
-            </a:r>
-            <a:r>
-              <a:rPr lang="en-US" altLang="ko-KR" dirty="0"/>
-              <a:t>, </a:t>
-            </a:r>
-            <a:r>
-              <a:rPr lang="ko-KR" altLang="en-US" dirty="0"/>
-              <a:t>하고 구현되었습니다</a:t>
+              <a:t>그렇게 하여 어플리케이션으로 구현된 저희의 서비스입니다</a:t>
             </a:r>
             <a:r>
               <a:rPr lang="en-US" altLang="ko-KR" dirty="0"/>
               <a:t>.</a:t>
             </a:r>
-          </a:p>
-          <a:p>
-            <a:endParaRPr lang="en-US" altLang="ko-KR" dirty="0"/>
           </a:p>
         </p:txBody>
       </p:sp>
@@ -1114,7 +1200,35 @@
           <a:bodyPr/>
           <a:lstStyle/>
           <a:p>
-            <a:endParaRPr lang="ko-KR" altLang="en-US" dirty="0"/>
+            <a:r>
+              <a:rPr lang="ko-KR" altLang="en-US" dirty="0"/>
+              <a:t>어플리케이션의 자세한 내용은 다음 시연 영상을 통해서 </a:t>
+            </a:r>
+            <a:r>
+              <a:rPr lang="ko-KR" altLang="en-US" dirty="0" err="1"/>
+              <a:t>설명드리겠습니다</a:t>
+            </a:r>
+            <a:r>
+              <a:rPr lang="en-US" altLang="ko-KR" dirty="0"/>
+              <a:t>.</a:t>
+            </a:r>
+          </a:p>
+          <a:p>
+            <a:r>
+              <a:rPr lang="en-US" altLang="ko-KR" dirty="0"/>
+              <a:t>---</a:t>
+            </a:r>
+            <a:r>
+              <a:rPr lang="ko-KR" altLang="en-US" dirty="0"/>
+              <a:t>시연 영상이 끝난 후</a:t>
+            </a:r>
+            <a:r>
+              <a:rPr lang="en-US" altLang="ko-KR" dirty="0"/>
+              <a:t>---</a:t>
+            </a:r>
+          </a:p>
+          <a:p>
+            <a:endParaRPr lang="en-US" altLang="ko-KR" dirty="0"/>
           </a:p>
         </p:txBody>
       </p:sp>
@@ -1199,6 +1313,18 @@
           <a:bodyPr/>
           <a:lstStyle/>
           <a:p>
+            <a:r>
+              <a:rPr lang="ko-KR" altLang="en-US" dirty="0"/>
+              <a:t>저희 서비스에 관하여 궁금한 점이나 질문하고 싶은 부분이 </a:t>
+            </a:r>
+            <a:r>
+              <a:rPr lang="ko-KR" altLang="en-US" dirty="0" err="1"/>
+              <a:t>있으신가요</a:t>
+            </a:r>
+            <a:r>
+              <a:rPr lang="en-US" altLang="ko-KR" dirty="0"/>
+              <a:t>?</a:t>
+            </a:r>
             <a:endParaRPr lang="ko-KR" altLang="en-US" dirty="0"/>
           </a:p>
         </p:txBody>
@@ -1381,6 +1507,42 @@
           <a:bodyPr/>
           <a:lstStyle/>
           <a:p>
+            <a:r>
+              <a:rPr lang="ko-KR" altLang="en-US" dirty="0"/>
+              <a:t>이상 </a:t>
+            </a:r>
+            <a:r>
+              <a:rPr lang="en-US" altLang="ko-KR" dirty="0"/>
+              <a:t>Null </a:t>
+            </a:r>
+            <a:r>
+              <a:rPr lang="ko-KR" altLang="en-US" dirty="0" err="1"/>
+              <a:t>사로잡겠어</a:t>
+            </a:r>
+            <a:r>
+              <a:rPr lang="ko-KR" altLang="en-US" dirty="0"/>
+              <a:t> </a:t>
+            </a:r>
+            <a:r>
+              <a:rPr lang="ko-KR" altLang="en-US" dirty="0" err="1"/>
+              <a:t>리턴즈</a:t>
+            </a:r>
+            <a:r>
+              <a:rPr lang="ko-KR" altLang="en-US" dirty="0"/>
+              <a:t> 조의 발표였습니다</a:t>
+            </a:r>
+            <a:r>
+              <a:rPr lang="en-US" altLang="ko-KR" dirty="0"/>
+              <a:t>. </a:t>
+            </a:r>
+            <a:r>
+              <a:rPr lang="ko-KR" altLang="en-US" dirty="0"/>
+              <a:t>감사합니다</a:t>
+            </a:r>
+            <a:r>
+              <a:rPr lang="en-US" altLang="ko-KR" dirty="0"/>
+              <a:t>.</a:t>
+            </a:r>
             <a:endParaRPr lang="ko-KR" altLang="en-US" dirty="0"/>
           </a:p>
         </p:txBody>
@@ -1602,7 +1764,7 @@
             <a:fld id="{89317EF2-BDDC-4628-AB95-33E6418FB6AF}" type="datetimeFigureOut">
               <a:rPr lang="ko-KR" altLang="en-US" smtClean="0"/>
               <a:pPr/>
-              <a:t>2018-06-18</a:t>
+              <a:t>2018-06-19</a:t>
             </a:fld>
             <a:endParaRPr lang="ko-KR" altLang="en-US"/>
           </a:p>
@@ -1767,7 +1929,7 @@
             <a:fld id="{89317EF2-BDDC-4628-AB95-33E6418FB6AF}" type="datetimeFigureOut">
               <a:rPr lang="ko-KR" altLang="en-US" smtClean="0"/>
               <a:pPr/>
-              <a:t>2018-06-18</a:t>
+              <a:t>2018-06-19</a:t>
             </a:fld>
             <a:endParaRPr lang="ko-KR" altLang="en-US"/>
           </a:p>
@@ -1942,7 +2104,7 @@
             <a:fld id="{89317EF2-BDDC-4628-AB95-33E6418FB6AF}" type="datetimeFigureOut">
               <a:rPr lang="ko-KR" altLang="en-US" smtClean="0"/>
               <a:pPr/>
-              <a:t>2018-06-18</a:t>
+              <a:t>2018-06-19</a:t>
             </a:fld>
             <a:endParaRPr lang="ko-KR" altLang="en-US"/>
           </a:p>
@@ -2177,7 +2339,7 @@
             <a:fld id="{89317EF2-BDDC-4628-AB95-33E6418FB6AF}" type="datetimeFigureOut">
               <a:rPr lang="ko-KR" altLang="en-US" smtClean="0"/>
               <a:pPr/>
-              <a:t>2018-06-18</a:t>
+              <a:t>2018-06-19</a:t>
             </a:fld>
             <a:endParaRPr lang="ko-KR" altLang="en-US"/>
           </a:p>
@@ -2419,7 +2581,7 @@
             <a:fld id="{89317EF2-BDDC-4628-AB95-33E6418FB6AF}" type="datetimeFigureOut">
               <a:rPr lang="ko-KR" altLang="en-US" smtClean="0"/>
               <a:pPr/>
-              <a:t>2018-06-18</a:t>
+              <a:t>2018-06-19</a:t>
             </a:fld>
             <a:endParaRPr lang="ko-KR" altLang="en-US"/>
           </a:p>
@@ -2701,7 +2863,7 @@
             <a:fld id="{89317EF2-BDDC-4628-AB95-33E6418FB6AF}" type="datetimeFigureOut">
               <a:rPr lang="ko-KR" altLang="en-US" smtClean="0"/>
               <a:pPr/>
-              <a:t>2018-06-18</a:t>
+              <a:t>2018-06-19</a:t>
             </a:fld>
             <a:endParaRPr lang="ko-KR" altLang="en-US"/>
           </a:p>
@@ -3117,7 +3279,7 @@
             <a:fld id="{89317EF2-BDDC-4628-AB95-33E6418FB6AF}" type="datetimeFigureOut">
               <a:rPr lang="ko-KR" altLang="en-US" smtClean="0"/>
               <a:pPr/>
-              <a:t>2018-06-18</a:t>
+              <a:t>2018-06-19</a:t>
             </a:fld>
             <a:endParaRPr lang="ko-KR" altLang="en-US"/>
           </a:p>
@@ -3231,7 +3393,7 @@
             <a:fld id="{89317EF2-BDDC-4628-AB95-33E6418FB6AF}" type="datetimeFigureOut">
               <a:rPr lang="ko-KR" altLang="en-US" smtClean="0"/>
               <a:pPr/>
-              <a:t>2018-06-18</a:t>
+              <a:t>2018-06-19</a:t>
             </a:fld>
             <a:endParaRPr lang="ko-KR" altLang="en-US"/>
           </a:p>
@@ -3323,7 +3485,7 @@
             <a:fld id="{89317EF2-BDDC-4628-AB95-33E6418FB6AF}" type="datetimeFigureOut">
               <a:rPr lang="ko-KR" altLang="en-US" smtClean="0"/>
               <a:pPr/>
-              <a:t>2018-06-18</a:t>
+              <a:t>2018-06-19</a:t>
             </a:fld>
             <a:endParaRPr lang="ko-KR" altLang="en-US"/>
           </a:p>
@@ -3595,7 +3757,7 @@
             <a:fld id="{89317EF2-BDDC-4628-AB95-33E6418FB6AF}" type="datetimeFigureOut">
               <a:rPr lang="ko-KR" altLang="en-US" smtClean="0"/>
               <a:pPr/>
-              <a:t>2018-06-18</a:t>
+              <a:t>2018-06-19</a:t>
             </a:fld>
             <a:endParaRPr lang="ko-KR" altLang="en-US"/>
           </a:p>
@@ -3844,7 +4006,7 @@
             <a:fld id="{89317EF2-BDDC-4628-AB95-33E6418FB6AF}" type="datetimeFigureOut">
               <a:rPr lang="ko-KR" altLang="en-US" smtClean="0"/>
               <a:pPr/>
-              <a:t>2018-06-18</a:t>
+              <a:t>2018-06-19</a:t>
             </a:fld>
             <a:endParaRPr lang="ko-KR" altLang="en-US"/>
           </a:p>
@@ -4052,7 +4214,7 @@
             <a:fld id="{89317EF2-BDDC-4628-AB95-33E6418FB6AF}" type="datetimeFigureOut">
               <a:rPr lang="ko-KR" altLang="en-US" smtClean="0"/>
               <a:pPr/>
-              <a:t>2018-06-18</a:t>
+              <a:t>2018-06-19</a:t>
             </a:fld>
             <a:endParaRPr lang="ko-KR" altLang="en-US"/>
           </a:p>
@@ -5473,8 +5635,8 @@
         </p:nvSpPr>
         <p:spPr>
           <a:xfrm>
-            <a:off x="2627784" y="2647668"/>
-            <a:ext cx="4187365" cy="398186"/>
+            <a:off x="2367298" y="2647668"/>
+            <a:ext cx="4708340" cy="398186"/>
           </a:xfrm>
           <a:prstGeom prst="rect">
             <a:avLst/>
@@ -5500,7 +5662,7 @@
                 <a:latin typeface="나눔고딕" pitchFamily="50" charset="-127"/>
                 <a:ea typeface="나눔고딕" pitchFamily="50" charset="-127"/>
               </a:rPr>
-              <a:t>버스를 탈 때</a:t>
+              <a:t>버스를 타려고 할 때</a:t>
             </a:r>
             <a:r>
               <a:rPr lang="en-US" altLang="ko-KR" sz="1500" spc="-150" dirty="0">
@@ -6670,6 +6832,91 @@
                 <a:schemeClr val="tx1"/>
               </a:solidFill>
             </a:endParaRPr>
+          </a:p>
+        </p:txBody>
+      </p:sp>
+      <p:pic>
+        <p:nvPicPr>
+          <p:cNvPr id="5" name="그림 4">
+            <a:extLst>
+              <a:ext uri="{FF2B5EF4-FFF2-40B4-BE49-F238E27FC236}">
+                <a16:creationId xmlns:a16="http://schemas.microsoft.com/office/drawing/2014/main" id="{2B7B7571-6A1B-40F2-9CF2-81BBAC98911D}"/>
+              </a:ext>
+            </a:extLst>
+          </p:cNvPr>
+          <p:cNvPicPr>
+            <a:picLocks noChangeAspect="1"/>
+          </p:cNvPicPr>
+          <p:nvPr/>
+        </p:nvPicPr>
+        <p:blipFill>
+          <a:blip r:embed="rId7">
+            <a:extLst>
+              <a:ext uri="{28A0092B-C50C-407E-A947-70E740481C1C}">
+                <a14:useLocalDpi xmlns:a14="http://schemas.microsoft.com/office/drawing/2010/main" val="0"/>
+              </a:ext>
+            </a:extLst>
+          </a:blip>
+          <a:stretch>
+            <a:fillRect/>
+          </a:stretch>
+        </p:blipFill>
+        <p:spPr>
+          <a:xfrm>
+            <a:off x="2446295" y="4087422"/>
+            <a:ext cx="1656185" cy="2736586"/>
+          </a:xfrm>
+          <a:prstGeom prst="rect">
+            <a:avLst/>
+          </a:prstGeom>
+        </p:spPr>
+      </p:pic>
+      <p:sp>
+        <p:nvSpPr>
+          <p:cNvPr id="14" name="화살표: 오른쪽 13">
+            <a:extLst>
+              <a:ext uri="{FF2B5EF4-FFF2-40B4-BE49-F238E27FC236}">
+                <a16:creationId xmlns:a16="http://schemas.microsoft.com/office/drawing/2014/main" id="{82D854A9-292D-4623-8C4D-4867159E7245}"/>
+              </a:ext>
+            </a:extLst>
+          </p:cNvPr>
+          <p:cNvSpPr/>
+          <p:nvPr/>
+        </p:nvSpPr>
+        <p:spPr>
+          <a:xfrm rot="10800000">
+            <a:off x="4246985" y="5095675"/>
+            <a:ext cx="504056" cy="360040"/>
+          </a:xfrm>
+          <a:prstGeom prst="rightArrow">
+            <a:avLst/>
+          </a:prstGeom>
+          <a:solidFill>
+            <a:srgbClr val="6BC8C0"/>
+          </a:solidFill>
+        </p:spPr>
+        <p:style>
+          <a:lnRef idx="2">
+            <a:schemeClr val="accent5">
+              <a:shade val="50000"/>
+            </a:schemeClr>
+          </a:lnRef>
+          <a:fillRef idx="1">
+            <a:schemeClr val="accent5"/>
+          </a:fillRef>
+          <a:effectRef idx="0">
+            <a:schemeClr val="accent5"/>
+          </a:effectRef>
+          <a:fontRef idx="minor">
+            <a:schemeClr val="lt1"/>
+          </a:fontRef>
+        </p:style>
+        <p:txBody>
+          <a:bodyPr rtlCol="0" anchor="ctr"/>
+          <a:lstStyle/>
+          <a:p>
+            <a:pPr algn="ctr"/>
+            <a:endParaRPr lang="ko-KR" altLang="en-US"/>
           </a:p>
         </p:txBody>
       </p:sp>

</xml_diff>